<commit_message>
final copies of report and powerpoint
final copies of report and powerpoint
</commit_message>
<xml_diff>
--- a/Task 3/Jon Fryman - D214 - Task 3.pptx
+++ b/Task 3/Jon Fryman - D214 - Task 3.pptx
@@ -5162,7 +5162,7 @@
         </p:nvSpPr>
         <p:spPr>
           <a:xfrm>
-            <a:off x="3371193" y="545251"/>
+            <a:off x="3371193" y="652763"/>
             <a:ext cx="4532586" cy="854075"/>
           </a:xfrm>
         </p:spPr>
@@ -5195,7 +5195,7 @@
         </p:nvSpPr>
         <p:spPr>
           <a:xfrm>
-            <a:off x="838200" y="1399326"/>
+            <a:off x="838200" y="1554984"/>
             <a:ext cx="10365828" cy="1874016"/>
           </a:xfrm>
         </p:spPr>
@@ -5243,7 +5243,7 @@
         </p:nvSpPr>
         <p:spPr>
           <a:xfrm>
-            <a:off x="4281651" y="3574780"/>
+            <a:off x="4281651" y="4016060"/>
             <a:ext cx="2711670" cy="686950"/>
           </a:xfrm>
           <a:prstGeom prst="rect">
@@ -5297,7 +5297,7 @@
         </p:nvSpPr>
         <p:spPr>
           <a:xfrm>
-            <a:off x="838200" y="4435996"/>
+            <a:off x="838200" y="4791677"/>
             <a:ext cx="9598572" cy="1022678"/>
           </a:xfrm>
           <a:prstGeom prst="rect">

</xml_diff>